<commit_message>
breadth first werkt eindelijk
</commit_message>
<xml_diff>
--- a/Presentatie_On_Track.pptx
+++ b/Presentatie_On_Track.pptx
@@ -229,7 +229,7 @@
   </p:defaultTextStyle>
   <p:extLst>
     <p:ext uri="{EFAFB233-063F-42B5-8137-9DF3F51BA10A}">
-      <p15:sldGuideLst xmlns:p15="http://schemas.microsoft.com/office/powerpoint/2012/main" xmlns="">
+      <p15:sldGuideLst xmlns="" xmlns:p15="http://schemas.microsoft.com/office/powerpoint/2012/main">
         <p15:guide id="1" orient="horz" pos="1620">
           <p15:clr>
             <a:srgbClr val="A4A3A4"/>
@@ -3310,11 +3310,11 @@
           <c:showPercent val="0"/>
           <c:showBubbleSize val="0"/>
         </c:dLbls>
-        <c:axId val="279462656"/>
-        <c:axId val="279464576"/>
+        <c:axId val="256005632"/>
+        <c:axId val="302236800"/>
       </c:scatterChart>
       <c:valAx>
-        <c:axId val="279462656"/>
+        <c:axId val="256005632"/>
         <c:scaling>
           <c:orientation val="minMax"/>
         </c:scaling>
@@ -3406,12 +3406,12 @@
             <a:endParaRPr lang="nl-NL"/>
           </a:p>
         </c:txPr>
-        <c:crossAx val="279464576"/>
+        <c:crossAx val="302236800"/>
         <c:crosses val="autoZero"/>
         <c:crossBetween val="midCat"/>
       </c:valAx>
       <c:valAx>
-        <c:axId val="279464576"/>
+        <c:axId val="302236800"/>
         <c:scaling>
           <c:orientation val="minMax"/>
         </c:scaling>
@@ -3504,7 +3504,7 @@
             <a:endParaRPr lang="nl-NL"/>
           </a:p>
         </c:txPr>
-        <c:crossAx val="279462656"/>
+        <c:crossAx val="256005632"/>
         <c:crosses val="autoZero"/>
         <c:crossBetween val="midCat"/>
       </c:valAx>
@@ -11656,7 +11656,12 @@
             <p:ph type="title"/>
           </p:nvPr>
         </p:nvSpPr>
-        <p:spPr/>
+        <p:spPr>
+          <a:xfrm>
+            <a:off x="311700" y="141580"/>
+            <a:ext cx="8520600" cy="629970"/>
+          </a:xfrm>
+        </p:spPr>
         <p:txBody>
           <a:bodyPr/>
           <a:lstStyle/>
@@ -11704,7 +11709,7 @@
         </p:blipFill>
         <p:spPr>
           <a:xfrm>
-            <a:off x="179512" y="1275606"/>
+            <a:off x="179512" y="1347614"/>
             <a:ext cx="3599035" cy="3470498"/>
           </a:xfrm>
           <a:prstGeom prst="rect">
@@ -11836,6 +11841,36 @@
           </a:p>
         </p:txBody>
       </p:sp>
+      <p:pic>
+        <p:nvPicPr>
+          <p:cNvPr id="3" name="Afbeelding 2"/>
+          <p:cNvPicPr>
+            <a:picLocks noChangeAspect="1"/>
+          </p:cNvPicPr>
+          <p:nvPr/>
+        </p:nvPicPr>
+        <p:blipFill>
+          <a:blip r:embed="rId4">
+            <a:extLst>
+              <a:ext uri="{28A0092B-C50C-407E-A947-70E740481C1C}">
+                <a14:useLocalDpi xmlns:a14="http://schemas.microsoft.com/office/drawing/2010/main" val="0"/>
+              </a:ext>
+            </a:extLst>
+          </a:blip>
+          <a:stretch>
+            <a:fillRect/>
+          </a:stretch>
+        </p:blipFill>
+        <p:spPr>
+          <a:xfrm>
+            <a:off x="323528" y="810138"/>
+            <a:ext cx="8568952" cy="368716"/>
+          </a:xfrm>
+          <a:prstGeom prst="rect">
+            <a:avLst/>
+          </a:prstGeom>
+        </p:spPr>
+      </p:pic>
     </p:spTree>
     <p:extLst>
       <p:ext uri="{BB962C8B-B14F-4D97-AF65-F5344CB8AC3E}">

</xml_diff>